<commit_message>
more bug fixes + preparing for unity team
</commit_message>
<xml_diff>
--- a/doc/Presentatie/SprintReview3.pptx
+++ b/doc/Presentatie/SprintReview3.pptx
@@ -4720,7 +4720,7 @@
                   <a:srgbClr val="00B050"/>
                 </a:solidFill>
               </a:rPr>
-              <a:t>(3sp) Als speler wil ik graag de opdracht te zien krijgen als ik op de locatie ben.</a:t>
+              <a:t>(3sp) Als speler zou ik graag op de locatie "de stadsfeestzaal" een quiz spelen</a:t>
             </a:r>
           </a:p>
           <a:p>
@@ -4730,7 +4730,27 @@
                   <a:srgbClr val="00B050"/>
                 </a:solidFill>
               </a:rPr>
-              <a:t>(3sp) Als speler zou ik graag op de locatie "de stadsfeestzaal" een quiz spelen</a:t>
+              <a:t>(5sp) Als speler wil ik mij kunnen registreren in het spel</a:t>
+            </a:r>
+          </a:p>
+          <a:p>
+            <a:r>
+              <a:rPr lang="nl-NL" dirty="0">
+                <a:solidFill>
+                  <a:srgbClr val="00B050"/>
+                </a:solidFill>
+              </a:rPr>
+              <a:t>(3sp) Als speler wil ik graag de opdracht te zien krijgen als ik op de locatie ben.</a:t>
+            </a:r>
+          </a:p>
+          <a:p>
+            <a:r>
+              <a:rPr lang="nl-NL" dirty="0">
+                <a:solidFill>
+                  <a:srgbClr val="00B050"/>
+                </a:solidFill>
+              </a:rPr>
+              <a:t>(2) Als speler zou ik graag een indicatie krijgen hoe ver ik van de volgende opdracht verwijderd ben.</a:t>
             </a:r>
           </a:p>
           <a:p>
@@ -4741,26 +4761,6 @@
                 </a:solidFill>
               </a:rPr>
               <a:t>(3sp) Als speler wil ik een sessie kunnen aanmaken.</a:t>
-            </a:r>
-          </a:p>
-          <a:p>
-            <a:r>
-              <a:rPr lang="nl-NL" dirty="0">
-                <a:solidFill>
-                  <a:srgbClr val="00B050"/>
-                </a:solidFill>
-              </a:rPr>
-              <a:t>(5sp) Als speler wil ik mij kunnen registreren in het spel</a:t>
-            </a:r>
-          </a:p>
-          <a:p>
-            <a:r>
-              <a:rPr lang="nl-NL" dirty="0">
-                <a:solidFill>
-                  <a:srgbClr val="00B050"/>
-                </a:solidFill>
-              </a:rPr>
-              <a:t>(2) Als speler zou ik graag een indicatie krijgen hoe ver ik van de volgende opdracht verwijderd ben.</a:t>
             </a:r>
           </a:p>
           <a:p>

</xml_diff>